<commit_message>
minor presentaation style changes
</commit_message>
<xml_diff>
--- a/docs/project_final_presentation.pptx
+++ b/docs/project_final_presentation.pptx
@@ -381,7 +381,7 @@
           <a:p>
             <a:fld id="{484FEB8E-57CB-43C0-BEF7-4F4116A5252C}" type="datetimeFigureOut">
               <a:rPr lang="de-CH" smtClean="0"/>
-              <a:t>13.06.2023</a:t>
+              <a:t>13.06.23</a:t>
             </a:fld>
             <a:endParaRPr lang="de-CH"/>
           </a:p>
@@ -540,7 +540,7 @@
           <a:p>
             <a:fld id="{DA53D58F-CC03-47C4-AC79-D3C984A61519}" type="slidenum">
               <a:rPr lang="de-CH" smtClean="0"/>
-              <a:t>‹#›</a:t>
+              <a:t>‹Nr.›</a:t>
             </a:fld>
             <a:endParaRPr lang="de-CH"/>
           </a:p>
@@ -997,7 +997,7 @@
             <a:fld id="{B3811826-9277-4232-A2B5-17D05DFC7392}" type="slidenum">
               <a:rPr lang="en-GB" smtClean="0"/>
               <a:pPr/>
-              <a:t>‹#›</a:t>
+              <a:t>‹Nr.›</a:t>
             </a:fld>
             <a:endParaRPr lang="en-GB" dirty="0"/>
           </a:p>
@@ -1498,7 +1498,7 @@
             <a:fld id="{B3811826-9277-4232-A2B5-17D05DFC7392}" type="slidenum">
               <a:rPr lang="en-GB" smtClean="0"/>
               <a:pPr/>
-              <a:t>‹#›</a:t>
+              <a:t>‹Nr.›</a:t>
             </a:fld>
             <a:endParaRPr lang="en-GB" dirty="0"/>
           </a:p>
@@ -1622,7 +1622,7 @@
             <a:fld id="{B3811826-9277-4232-A2B5-17D05DFC7392}" type="slidenum">
               <a:rPr lang="en-GB" smtClean="0"/>
               <a:pPr/>
-              <a:t>‹#›</a:t>
+              <a:t>‹Nr.›</a:t>
             </a:fld>
             <a:endParaRPr lang="en-GB" dirty="0"/>
           </a:p>
@@ -1847,7 +1847,7 @@
             <a:fld id="{B3811826-9277-4232-A2B5-17D05DFC7392}" type="slidenum">
               <a:rPr lang="en-GB" smtClean="0"/>
               <a:pPr/>
-              <a:t>‹#›</a:t>
+              <a:t>‹Nr.›</a:t>
             </a:fld>
             <a:endParaRPr lang="en-GB" dirty="0"/>
           </a:p>
@@ -2173,7 +2173,7 @@
             <a:fld id="{B3811826-9277-4232-A2B5-17D05DFC7392}" type="slidenum">
               <a:rPr lang="en-GB" smtClean="0"/>
               <a:pPr/>
-              <a:t>‹#›</a:t>
+              <a:t>‹Nr.›</a:t>
             </a:fld>
             <a:endParaRPr lang="en-GB" dirty="0"/>
           </a:p>
@@ -2577,7 +2577,7 @@
             <a:fld id="{B3811826-9277-4232-A2B5-17D05DFC7392}" type="slidenum">
               <a:rPr lang="en-GB" smtClean="0"/>
               <a:pPr/>
-              <a:t>‹#›</a:t>
+              <a:t>‹Nr.›</a:t>
             </a:fld>
             <a:endParaRPr lang="en-GB" dirty="0"/>
           </a:p>
@@ -2860,7 +2860,7 @@
             <a:fld id="{B3811826-9277-4232-A2B5-17D05DFC7392}" type="slidenum">
               <a:rPr lang="en-GB" smtClean="0"/>
               <a:pPr/>
-              <a:t>‹#›</a:t>
+              <a:t>‹Nr.›</a:t>
             </a:fld>
             <a:endParaRPr lang="en-GB" dirty="0"/>
           </a:p>
@@ -3177,7 +3177,7 @@
             <a:fld id="{B3811826-9277-4232-A2B5-17D05DFC7392}" type="slidenum">
               <a:rPr lang="en-GB" smtClean="0"/>
               <a:pPr/>
-              <a:t>‹#›</a:t>
+              <a:t>‹Nr.›</a:t>
             </a:fld>
             <a:endParaRPr lang="en-GB" dirty="0"/>
           </a:p>
@@ -3566,7 +3566,7 @@
             </a:r>
             <a:r>
               <a:rPr lang="en-GB" dirty="0"/>
-              <a:t> &amp; Pascal Wohlwender, 13 June 2023</a:t>
+              <a:t> &amp; Pascal Wohlwender, 14 June 2023</a:t>
             </a:r>
           </a:p>
         </p:txBody>
@@ -3663,47 +3663,6 @@
       </p:sp>
       <p:sp>
         <p:nvSpPr>
-          <p:cNvPr id="3" name="Inhaltsplatzhalter 2"/>
-          <p:cNvSpPr>
-            <a:spLocks noGrp="1"/>
-          </p:cNvSpPr>
-          <p:nvPr>
-            <p:ph idx="1"/>
-          </p:nvPr>
-        </p:nvSpPr>
-        <p:spPr/>
-        <p:txBody>
-          <a:bodyPr/>
-          <a:lstStyle/>
-          <a:p>
-            <a:pPr lvl="2"/>
-            <a:r>
-              <a:rPr lang="en-GB" dirty="0"/>
-              <a:t>While loop which takes input</a:t>
-            </a:r>
-          </a:p>
-          <a:p>
-            <a:pPr lvl="2"/>
-            <a:r>
-              <a:rPr lang="en-GB" dirty="0"/>
-              <a:t>Input then handled</a:t>
-            </a:r>
-          </a:p>
-          <a:p>
-            <a:pPr lvl="2"/>
-            <a:r>
-              <a:rPr lang="en-GB" dirty="0" err="1"/>
-              <a:t>readline</a:t>
-            </a:r>
-            <a:r>
-              <a:rPr lang="en-GB" dirty="0"/>
-              <a:t> library used for command history</a:t>
-            </a:r>
-          </a:p>
-        </p:txBody>
-      </p:sp>
-      <p:sp>
-        <p:nvSpPr>
           <p:cNvPr id="4" name="Datumsplatzhalter 3"/>
           <p:cNvSpPr>
             <a:spLocks noGrp="1"/>
@@ -3795,8 +3754,8 @@
         </p:nvSpPr>
         <p:spPr>
           <a:xfrm>
-            <a:off x="611560" y="2420888"/>
-            <a:ext cx="5760640" cy="3600400"/>
+            <a:off x="454914" y="2528510"/>
+            <a:ext cx="5760640" cy="3672408"/>
           </a:xfrm>
           <a:prstGeom prst="rect">
             <a:avLst/>
@@ -4064,6 +4023,220 @@
             <a:r>
               <a:rPr lang="en-GB" dirty="0"/>
               <a:t>}</a:t>
+            </a:r>
+          </a:p>
+        </p:txBody>
+      </p:sp>
+      <p:sp>
+        <p:nvSpPr>
+          <p:cNvPr id="9" name="Inhaltsplatzhalter 2">
+            <a:extLst>
+              <a:ext uri="{FF2B5EF4-FFF2-40B4-BE49-F238E27FC236}">
+                <a16:creationId xmlns:a16="http://schemas.microsoft.com/office/drawing/2014/main" id="{AA9229D3-FAD4-E1B0-C336-C048AA6C5CAC}"/>
+              </a:ext>
+            </a:extLst>
+          </p:cNvPr>
+          <p:cNvSpPr txBox="1">
+            <a:spLocks/>
+          </p:cNvSpPr>
+          <p:nvPr/>
+        </p:nvSpPr>
+        <p:spPr>
+          <a:xfrm>
+            <a:off x="431900" y="1484456"/>
+            <a:ext cx="8280200" cy="4716462"/>
+          </a:xfrm>
+          <a:prstGeom prst="rect">
+            <a:avLst/>
+          </a:prstGeom>
+        </p:spPr>
+        <p:txBody>
+          <a:bodyPr vert="horz" lIns="0" tIns="0" rIns="0" bIns="0" rtlCol="0">
+            <a:noAutofit/>
+          </a:bodyPr>
+          <a:lstStyle>
+            <a:lvl1pPr marL="0" indent="0" algn="l" defTabSz="914400" rtl="0" eaLnBrk="1" latinLnBrk="0" hangingPunct="1">
+              <a:lnSpc>
+                <a:spcPts val="2200"/>
+              </a:lnSpc>
+              <a:spcBef>
+                <a:spcPts val="0"/>
+              </a:spcBef>
+              <a:buFont typeface="Arial" panose="020B0604020202020204" pitchFamily="34" charset="0"/>
+              <a:buNone/>
+              <a:defRPr sz="1800" kern="1200">
+                <a:solidFill>
+                  <a:schemeClr val="tx1"/>
+                </a:solidFill>
+                <a:latin typeface="+mn-lt"/>
+                <a:ea typeface="+mn-ea"/>
+                <a:cs typeface="+mn-cs"/>
+              </a:defRPr>
+            </a:lvl1pPr>
+            <a:lvl2pPr marL="180000" indent="-180000" algn="l" defTabSz="914400" rtl="0" eaLnBrk="1" latinLnBrk="0" hangingPunct="1">
+              <a:lnSpc>
+                <a:spcPts val="2200"/>
+              </a:lnSpc>
+              <a:spcBef>
+                <a:spcPts val="0"/>
+              </a:spcBef>
+              <a:buFont typeface="Arial" panose="020B0604020202020204" pitchFamily="34" charset="0"/>
+              <a:buChar char="–"/>
+              <a:defRPr sz="1800" kern="1200">
+                <a:solidFill>
+                  <a:schemeClr val="tx1"/>
+                </a:solidFill>
+                <a:latin typeface="+mn-lt"/>
+                <a:ea typeface="+mn-ea"/>
+                <a:cs typeface="+mn-cs"/>
+              </a:defRPr>
+            </a:lvl2pPr>
+            <a:lvl3pPr marL="360000" indent="-180000" algn="l" defTabSz="914400" rtl="0" eaLnBrk="1" latinLnBrk="0" hangingPunct="1">
+              <a:lnSpc>
+                <a:spcPts val="2200"/>
+              </a:lnSpc>
+              <a:spcBef>
+                <a:spcPts val="0"/>
+              </a:spcBef>
+              <a:buFont typeface="Arial" panose="020B0604020202020204" pitchFamily="34" charset="0"/>
+              <a:buChar char="–"/>
+              <a:defRPr sz="1800" kern="1200">
+                <a:solidFill>
+                  <a:schemeClr val="tx1"/>
+                </a:solidFill>
+                <a:latin typeface="+mn-lt"/>
+                <a:ea typeface="+mn-ea"/>
+                <a:cs typeface="+mn-cs"/>
+              </a:defRPr>
+            </a:lvl3pPr>
+            <a:lvl4pPr marL="540000" indent="-180000" algn="l" defTabSz="914400" rtl="0" eaLnBrk="1" latinLnBrk="0" hangingPunct="1">
+              <a:lnSpc>
+                <a:spcPts val="2200"/>
+              </a:lnSpc>
+              <a:spcBef>
+                <a:spcPts val="0"/>
+              </a:spcBef>
+              <a:buFont typeface="Arial" panose="020B0604020202020204" pitchFamily="34" charset="0"/>
+              <a:buChar char="–"/>
+              <a:defRPr sz="1800" kern="1200">
+                <a:solidFill>
+                  <a:schemeClr val="tx1"/>
+                </a:solidFill>
+                <a:latin typeface="+mn-lt"/>
+                <a:ea typeface="+mn-ea"/>
+                <a:cs typeface="+mn-cs"/>
+              </a:defRPr>
+            </a:lvl4pPr>
+            <a:lvl5pPr marL="720000" indent="-180000" algn="l" defTabSz="914400" rtl="0" eaLnBrk="1" latinLnBrk="0" hangingPunct="1">
+              <a:lnSpc>
+                <a:spcPts val="2200"/>
+              </a:lnSpc>
+              <a:spcBef>
+                <a:spcPts val="0"/>
+              </a:spcBef>
+              <a:buFont typeface="Arial" panose="020B0604020202020204" pitchFamily="34" charset="0"/>
+              <a:buChar char="–"/>
+              <a:defRPr sz="1800" kern="1200">
+                <a:solidFill>
+                  <a:schemeClr val="tx1"/>
+                </a:solidFill>
+                <a:latin typeface="+mn-lt"/>
+                <a:ea typeface="+mn-ea"/>
+                <a:cs typeface="+mn-cs"/>
+              </a:defRPr>
+            </a:lvl5pPr>
+            <a:lvl6pPr marL="2514600" indent="-228600" algn="l" defTabSz="914400" rtl="0" eaLnBrk="1" latinLnBrk="0" hangingPunct="1">
+              <a:spcBef>
+                <a:spcPct val="20000"/>
+              </a:spcBef>
+              <a:buFont typeface="Arial" panose="020B0604020202020204" pitchFamily="34" charset="0"/>
+              <a:buChar char="•"/>
+              <a:defRPr sz="2000" kern="1200">
+                <a:solidFill>
+                  <a:schemeClr val="tx1"/>
+                </a:solidFill>
+                <a:latin typeface="+mn-lt"/>
+                <a:ea typeface="+mn-ea"/>
+                <a:cs typeface="+mn-cs"/>
+              </a:defRPr>
+            </a:lvl6pPr>
+            <a:lvl7pPr marL="2971800" indent="-228600" algn="l" defTabSz="914400" rtl="0" eaLnBrk="1" latinLnBrk="0" hangingPunct="1">
+              <a:spcBef>
+                <a:spcPct val="20000"/>
+              </a:spcBef>
+              <a:buFont typeface="Arial" panose="020B0604020202020204" pitchFamily="34" charset="0"/>
+              <a:buChar char="•"/>
+              <a:defRPr sz="2000" kern="1200">
+                <a:solidFill>
+                  <a:schemeClr val="tx1"/>
+                </a:solidFill>
+                <a:latin typeface="+mn-lt"/>
+                <a:ea typeface="+mn-ea"/>
+                <a:cs typeface="+mn-cs"/>
+              </a:defRPr>
+            </a:lvl7pPr>
+            <a:lvl8pPr marL="3429000" indent="-228600" algn="l" defTabSz="914400" rtl="0" eaLnBrk="1" latinLnBrk="0" hangingPunct="1">
+              <a:spcBef>
+                <a:spcPct val="20000"/>
+              </a:spcBef>
+              <a:buFont typeface="Arial" panose="020B0604020202020204" pitchFamily="34" charset="0"/>
+              <a:buChar char="•"/>
+              <a:defRPr sz="2000" kern="1200">
+                <a:solidFill>
+                  <a:schemeClr val="tx1"/>
+                </a:solidFill>
+                <a:latin typeface="+mn-lt"/>
+                <a:ea typeface="+mn-ea"/>
+                <a:cs typeface="+mn-cs"/>
+              </a:defRPr>
+            </a:lvl8pPr>
+            <a:lvl9pPr marL="3886200" indent="-228600" algn="l" defTabSz="914400" rtl="0" eaLnBrk="1" latinLnBrk="0" hangingPunct="1">
+              <a:spcBef>
+                <a:spcPct val="20000"/>
+              </a:spcBef>
+              <a:buFont typeface="Arial" panose="020B0604020202020204" pitchFamily="34" charset="0"/>
+              <a:buChar char="•"/>
+              <a:defRPr sz="2000" kern="1200">
+                <a:solidFill>
+                  <a:schemeClr val="tx1"/>
+                </a:solidFill>
+                <a:latin typeface="+mn-lt"/>
+                <a:ea typeface="+mn-ea"/>
+                <a:cs typeface="+mn-cs"/>
+              </a:defRPr>
+            </a:lvl9pPr>
+          </a:lstStyle>
+          <a:p>
+            <a:pPr lvl="1"/>
+            <a:r>
+              <a:rPr lang="en-GB" dirty="0"/>
+              <a:t>While loop which takes input</a:t>
+            </a:r>
+          </a:p>
+          <a:p>
+            <a:pPr lvl="1"/>
+            <a:r>
+              <a:rPr lang="en-GB" dirty="0"/>
+              <a:t>Input then handled</a:t>
+            </a:r>
+          </a:p>
+          <a:p>
+            <a:pPr lvl="1"/>
+            <a:r>
+              <a:rPr lang="en-GB" dirty="0" err="1">
+                <a:solidFill>
+                  <a:srgbClr val="000000"/>
+                </a:solidFill>
+              </a:rPr>
+              <a:t>Readline</a:t>
+            </a:r>
+            <a:r>
+              <a:rPr lang="en-GB" dirty="0">
+                <a:solidFill>
+                  <a:srgbClr val="000000"/>
+                </a:solidFill>
+              </a:rPr>
+              <a:t> library used for command history</a:t>
             </a:r>
           </a:p>
         </p:txBody>
@@ -4123,36 +4296,6 @@
       </p:sp>
       <p:sp>
         <p:nvSpPr>
-          <p:cNvPr id="3" name="Inhaltsplatzhalter 2"/>
-          <p:cNvSpPr>
-            <a:spLocks noGrp="1"/>
-          </p:cNvSpPr>
-          <p:nvPr>
-            <p:ph idx="1"/>
-          </p:nvPr>
-        </p:nvSpPr>
-        <p:spPr>
-          <a:xfrm>
-            <a:off x="539552" y="3824105"/>
-            <a:ext cx="3635944" cy="612030"/>
-          </a:xfrm>
-        </p:spPr>
-        <p:txBody>
-          <a:bodyPr/>
-          <a:lstStyle/>
-          <a:p>
-            <a:pPr marL="180000" lvl="2" indent="0">
-              <a:buNone/>
-            </a:pPr>
-            <a:r>
-              <a:rPr lang="en-GB" dirty="0"/>
-              <a:t>File execution:</a:t>
-            </a:r>
-          </a:p>
-        </p:txBody>
-      </p:sp>
-      <p:sp>
-        <p:nvSpPr>
           <p:cNvPr id="4" name="Datumsplatzhalter 3"/>
           <p:cNvSpPr>
             <a:spLocks noGrp="1"/>
@@ -4244,7 +4387,7 @@
         </p:nvSpPr>
         <p:spPr>
           <a:xfrm>
-            <a:off x="683568" y="4183942"/>
+            <a:off x="431800" y="4399910"/>
             <a:ext cx="3744416" cy="1764536"/>
           </a:xfrm>
           <a:prstGeom prst="rect">
@@ -4393,7 +4536,7 @@
         </p:nvSpPr>
         <p:spPr>
           <a:xfrm>
-            <a:off x="4895906" y="1916832"/>
+            <a:off x="4644138" y="1930474"/>
             <a:ext cx="3744416" cy="1764536"/>
           </a:xfrm>
           <a:prstGeom prst="rect">
@@ -4493,8 +4636,8 @@
         </p:nvSpPr>
         <p:spPr>
           <a:xfrm>
-            <a:off x="4895906" y="1507842"/>
-            <a:ext cx="2664296" cy="648072"/>
+            <a:off x="4644138" y="1521484"/>
+            <a:ext cx="2664296" cy="408332"/>
           </a:xfrm>
           <a:prstGeom prst="rect">
             <a:avLst/>
@@ -4533,7 +4676,7 @@
         </p:nvSpPr>
         <p:spPr>
           <a:xfrm>
-            <a:off x="683568" y="1916174"/>
+            <a:off x="431800" y="1929816"/>
             <a:ext cx="3744416" cy="1764536"/>
           </a:xfrm>
           <a:prstGeom prst="rect">
@@ -4644,8 +4787,8 @@
         </p:nvSpPr>
         <p:spPr>
           <a:xfrm>
-            <a:off x="683568" y="1507184"/>
-            <a:ext cx="2664296" cy="648072"/>
+            <a:off x="431800" y="1520826"/>
+            <a:ext cx="2664296" cy="408990"/>
           </a:xfrm>
           <a:prstGeom prst="rect">
             <a:avLst/>
@@ -4684,8 +4827,8 @@
         </p:nvSpPr>
         <p:spPr>
           <a:xfrm>
-            <a:off x="4895906" y="3879057"/>
-            <a:ext cx="3564526" cy="1872208"/>
+            <a:off x="4644138" y="3990920"/>
+            <a:ext cx="3564526" cy="2173526"/>
           </a:xfrm>
           <a:prstGeom prst="rect">
             <a:avLst/>
@@ -4743,6 +4886,16 @@
             </a:r>
           </a:p>
           <a:p>
+            <a:pPr marL="800100" lvl="1" indent="-342900">
+              <a:lnSpc>
+                <a:spcPts val="2200"/>
+              </a:lnSpc>
+              <a:buFont typeface="Arial" panose="020B0604020202020204" pitchFamily="34" charset="0"/>
+              <a:buChar char="–"/>
+            </a:pPr>
+            <a:endParaRPr lang="en-US" dirty="0"/>
+          </a:p>
+          <a:p>
             <a:pPr marL="342900" indent="-342900">
               <a:lnSpc>
                 <a:spcPts val="2200"/>
@@ -4774,6 +4927,46 @@
             <a:r>
               <a:rPr lang="en-US" dirty="0"/>
               <a:t>guess letters until correct</a:t>
+            </a:r>
+          </a:p>
+        </p:txBody>
+      </p:sp>
+      <p:sp>
+        <p:nvSpPr>
+          <p:cNvPr id="17" name="TextBox 10">
+            <a:extLst>
+              <a:ext uri="{FF2B5EF4-FFF2-40B4-BE49-F238E27FC236}">
+                <a16:creationId xmlns:a16="http://schemas.microsoft.com/office/drawing/2014/main" id="{A8B267AC-AA24-8BFA-779D-A103FDDF496D}"/>
+              </a:ext>
+            </a:extLst>
+          </p:cNvPr>
+          <p:cNvSpPr txBox="1"/>
+          <p:nvPr/>
+        </p:nvSpPr>
+        <p:spPr>
+          <a:xfrm>
+            <a:off x="431800" y="3990920"/>
+            <a:ext cx="2686681" cy="408990"/>
+          </a:xfrm>
+          <a:prstGeom prst="rect">
+            <a:avLst/>
+          </a:prstGeom>
+          <a:noFill/>
+        </p:spPr>
+        <p:txBody>
+          <a:bodyPr wrap="square" lIns="0" tIns="0" rIns="0" bIns="0" rtlCol="0">
+            <a:noAutofit/>
+          </a:bodyPr>
+          <a:lstStyle/>
+          <a:p>
+            <a:pPr>
+              <a:lnSpc>
+                <a:spcPts val="2200"/>
+              </a:lnSpc>
+            </a:pPr>
+            <a:r>
+              <a:rPr lang="en-US" dirty="0"/>
+              <a:t>File execution:</a:t>
             </a:r>
           </a:p>
         </p:txBody>
@@ -4849,7 +5042,7 @@
             <a:pPr lvl="1"/>
             <a:r>
               <a:rPr lang="en-GB" dirty="0"/>
-              <a:t>The productivity mode is a separate thread.</a:t>
+              <a:t>The productivity mode is a separate thread</a:t>
             </a:r>
           </a:p>
           <a:p>
@@ -4860,7 +5053,7 @@
             <a:pPr lvl="1"/>
             <a:r>
               <a:rPr lang="en-GB" dirty="0"/>
-              <a:t>If a new window is created, the blocked processes are killed.</a:t>
+              <a:t>If a new window is created, the blocked processes are killed</a:t>
             </a:r>
           </a:p>
         </p:txBody>
@@ -5202,21 +5395,16 @@
               <a:rPr lang="en-GB" b="1" dirty="0"/>
               <a:t>/etc/hosts</a:t>
             </a:r>
+          </a:p>
+          <a:p>
+            <a:pPr lvl="1"/>
+            <a:endParaRPr lang="en-GB" dirty="0"/>
+          </a:p>
+          <a:p>
+            <a:pPr lvl="1"/>
             <a:r>
               <a:rPr lang="en-GB" dirty="0"/>
-              <a:t>.</a:t>
-            </a:r>
-            <a:endParaRPr lang="en-GB" b="1" dirty="0"/>
-          </a:p>
-          <a:p>
-            <a:pPr lvl="1"/>
-            <a:endParaRPr lang="en-GB" dirty="0"/>
-          </a:p>
-          <a:p>
-            <a:pPr lvl="1"/>
-            <a:r>
-              <a:rPr lang="en-GB" dirty="0"/>
-              <a:t>Modifying the hosts file needs root permissions.</a:t>
+              <a:t>Modifying the hosts file needs root permissions</a:t>
             </a:r>
           </a:p>
           <a:p>
@@ -5233,10 +5421,7 @@
               <a:rPr lang="en-GB" b="1" dirty="0" err="1"/>
               <a:t>sudo</a:t>
             </a:r>
-            <a:r>
-              <a:rPr lang="en-GB" dirty="0"/>
-              <a:t>.</a:t>
-            </a:r>
+            <a:endParaRPr lang="en-GB" dirty="0"/>
           </a:p>
           <a:p>
             <a:pPr lvl="1"/>
@@ -6498,7 +6683,7 @@
             </a:pPr>
             <a:r>
               <a:rPr lang="en-GB" dirty="0"/>
-              <a:t>Start productivity mode.</a:t>
+              <a:t>Start productivity mode</a:t>
             </a:r>
           </a:p>
           <a:p>
@@ -7695,7 +7880,7 @@
             </a:pPr>
             <a:r>
               <a:rPr lang="en-GB" dirty="0"/>
-              <a:t>Start productivity mode.</a:t>
+              <a:t>Start productivity mode</a:t>
             </a:r>
           </a:p>
           <a:p>
@@ -7710,7 +7895,7 @@
             </a:pPr>
             <a:r>
               <a:rPr lang="en-GB" dirty="0"/>
-              <a:t>Work on your project.</a:t>
+              <a:t>Work on your project</a:t>
             </a:r>
           </a:p>
           <a:p>
@@ -8907,7 +9092,7 @@
             </a:pPr>
             <a:r>
               <a:rPr lang="en-GB" dirty="0"/>
-              <a:t>Start productivity mode.</a:t>
+              <a:t>Start productivity mode</a:t>
             </a:r>
           </a:p>
           <a:p>
@@ -8922,7 +9107,7 @@
             </a:pPr>
             <a:r>
               <a:rPr lang="en-GB" dirty="0"/>
-              <a:t>Work on your project.</a:t>
+              <a:t>Work on your project</a:t>
             </a:r>
           </a:p>
           <a:p>
@@ -10694,7 +10879,7 @@
             </a:pPr>
             <a:r>
               <a:rPr lang="en-GB" dirty="0"/>
-              <a:t>Start productivity mode.</a:t>
+              <a:t>Start productivity mode</a:t>
             </a:r>
           </a:p>
           <a:p>
@@ -10709,7 +10894,7 @@
             </a:pPr>
             <a:r>
               <a:rPr lang="en-GB" dirty="0"/>
-              <a:t>Work on your project.</a:t>
+              <a:t>Work on your project</a:t>
             </a:r>
           </a:p>
           <a:p>
@@ -10724,7 +10909,7 @@
             </a:pPr>
             <a:r>
               <a:rPr lang="en-GB" dirty="0"/>
-              <a:t>If you try to open a distracting app or website, you will receive an error.</a:t>
+              <a:t>If you try to open a distracting app or website, you will receive an error</a:t>
             </a:r>
           </a:p>
           <a:p>
@@ -10796,31 +10981,6 @@
       </p:sp>
       <p:sp>
         <p:nvSpPr>
-          <p:cNvPr id="3" name="Inhaltsplatzhalter 2"/>
-          <p:cNvSpPr>
-            <a:spLocks noGrp="1"/>
-          </p:cNvSpPr>
-          <p:nvPr>
-            <p:ph idx="1"/>
-          </p:nvPr>
-        </p:nvSpPr>
-        <p:spPr/>
-        <p:txBody>
-          <a:bodyPr/>
-          <a:lstStyle/>
-          <a:p>
-            <a:pPr marL="0" lvl="1" indent="0">
-              <a:buNone/>
-            </a:pPr>
-            <a:r>
-              <a:rPr lang="en-GB" dirty="0"/>
-              <a:t>Overview of the program</a:t>
-            </a:r>
-          </a:p>
-        </p:txBody>
-      </p:sp>
-      <p:sp>
-        <p:nvSpPr>
           <p:cNvPr id="4" name="Datumsplatzhalter 3"/>
           <p:cNvSpPr>
             <a:spLocks noGrp="1"/>
@@ -10912,7 +11072,7 @@
         </p:nvGrpSpPr>
         <p:grpSpPr>
           <a:xfrm>
-            <a:off x="431800" y="2132856"/>
+            <a:off x="431800" y="1538783"/>
             <a:ext cx="1008112" cy="1008112"/>
             <a:chOff x="431800" y="1528637"/>
             <a:chExt cx="1008112" cy="1008112"/>
@@ -11048,7 +11208,7 @@
         </p:nvGrpSpPr>
         <p:grpSpPr>
           <a:xfrm>
-            <a:off x="431800" y="3375001"/>
+            <a:off x="431800" y="2780928"/>
             <a:ext cx="1008112" cy="1008112"/>
             <a:chOff x="431800" y="1528637"/>
             <a:chExt cx="1008112" cy="1008112"/>
@@ -11184,7 +11344,7 @@
         </p:nvGrpSpPr>
         <p:grpSpPr>
           <a:xfrm>
-            <a:off x="431800" y="4617146"/>
+            <a:off x="431800" y="4023073"/>
             <a:ext cx="1008112" cy="1008112"/>
             <a:chOff x="431800" y="1528637"/>
             <a:chExt cx="1008112" cy="1008112"/>
@@ -11320,7 +11480,7 @@
         </p:nvSpPr>
         <p:spPr>
           <a:xfrm>
-            <a:off x="1655527" y="2453195"/>
+            <a:off x="1655527" y="1859122"/>
             <a:ext cx="2088232" cy="288032"/>
           </a:xfrm>
           <a:prstGeom prst="rect">
@@ -11361,7 +11521,7 @@
         </p:nvSpPr>
         <p:spPr>
           <a:xfrm>
-            <a:off x="1655527" y="3695340"/>
+            <a:off x="1655527" y="3101267"/>
             <a:ext cx="2088232" cy="288032"/>
           </a:xfrm>
           <a:prstGeom prst="rect">
@@ -11402,7 +11562,7 @@
         </p:nvSpPr>
         <p:spPr>
           <a:xfrm>
-            <a:off x="1655527" y="4911521"/>
+            <a:off x="1655527" y="4317448"/>
             <a:ext cx="2088232" cy="288032"/>
           </a:xfrm>
           <a:prstGeom prst="rect">
@@ -11443,7 +11603,7 @@
         </p:nvGrpSpPr>
         <p:grpSpPr>
           <a:xfrm>
-            <a:off x="4605554" y="2132856"/>
+            <a:off x="4605554" y="1538783"/>
             <a:ext cx="1008112" cy="1008112"/>
             <a:chOff x="431800" y="1528637"/>
             <a:chExt cx="1008112" cy="1008112"/>
@@ -11579,7 +11739,7 @@
         </p:nvSpPr>
         <p:spPr>
           <a:xfrm>
-            <a:off x="5829690" y="2453195"/>
+            <a:off x="5829690" y="1859122"/>
             <a:ext cx="2088232" cy="288032"/>
           </a:xfrm>
           <a:prstGeom prst="rect">
@@ -11620,7 +11780,7 @@
         </p:nvGrpSpPr>
         <p:grpSpPr>
           <a:xfrm>
-            <a:off x="4603685" y="3375001"/>
+            <a:off x="4603685" y="2780928"/>
             <a:ext cx="1008112" cy="1008112"/>
             <a:chOff x="431800" y="1528637"/>
             <a:chExt cx="1008112" cy="1008112"/>
@@ -11756,7 +11916,7 @@
         </p:nvSpPr>
         <p:spPr>
           <a:xfrm>
-            <a:off x="5827412" y="3695340"/>
+            <a:off x="5827412" y="3101267"/>
             <a:ext cx="2088232" cy="288032"/>
           </a:xfrm>
           <a:prstGeom prst="rect">
@@ -11780,6 +11940,43 @@
               <a:t>productivity_mode.h</a:t>
             </a:r>
             <a:endParaRPr lang="en-US" dirty="0"/>
+          </a:p>
+        </p:txBody>
+      </p:sp>
+      <p:sp>
+        <p:nvSpPr>
+          <p:cNvPr id="19" name="Textfeld 18">
+            <a:extLst>
+              <a:ext uri="{FF2B5EF4-FFF2-40B4-BE49-F238E27FC236}">
+                <a16:creationId xmlns:a16="http://schemas.microsoft.com/office/drawing/2014/main" id="{9DE31303-C616-2CB5-23CA-3308188D8399}"/>
+              </a:ext>
+            </a:extLst>
+          </p:cNvPr>
+          <p:cNvSpPr txBox="1"/>
+          <p:nvPr/>
+        </p:nvSpPr>
+        <p:spPr>
+          <a:xfrm>
+            <a:off x="-498764" y="1704109"/>
+            <a:ext cx="0" cy="0"/>
+          </a:xfrm>
+          <a:prstGeom prst="rect">
+            <a:avLst/>
+          </a:prstGeom>
+          <a:noFill/>
+        </p:spPr>
+        <p:txBody>
+          <a:bodyPr wrap="none" lIns="0" tIns="0" rIns="0" bIns="0" rtlCol="0">
+            <a:noAutofit/>
+          </a:bodyPr>
+          <a:lstStyle/>
+          <a:p>
+            <a:pPr>
+              <a:lnSpc>
+                <a:spcPts val="2200"/>
+              </a:lnSpc>
+            </a:pPr>
+            <a:endParaRPr lang="en-GB" dirty="0"/>
           </a:p>
         </p:txBody>
       </p:sp>

</xml_diff>